<commit_message>
added references, reshuffled arrangement
</commit_message>
<xml_diff>
--- a/HPB-Summit2021/HPB-Summit2021.pptx
+++ b/HPB-Summit2021/HPB-Summit2021.pptx
@@ -4605,7 +4605,7 @@
         <p:spPr bwMode="auto">
           <a:xfrm>
             <a:off x="21759730" y="485983"/>
-            <a:ext cx="19539515" cy="12700926"/>
+            <a:ext cx="19539515" cy="7661767"/>
           </a:xfrm>
           <a:prstGeom prst="rect">
             <a:avLst/>
@@ -5176,8 +5176,8 @@
         </p:nvSpPr>
         <p:spPr>
           <a:xfrm>
-            <a:off x="21759730" y="13853908"/>
-            <a:ext cx="19539515" cy="12680547"/>
+            <a:off x="21759730" y="8674928"/>
+            <a:ext cx="19539515" cy="17859526"/>
           </a:xfrm>
           <a:prstGeom prst="rect">
             <a:avLst/>
@@ -5420,7 +5420,7 @@
         </p:nvSpPr>
         <p:spPr bwMode="auto">
           <a:xfrm>
-            <a:off x="21764331" y="13853905"/>
+            <a:off x="21764331" y="8595186"/>
             <a:ext cx="19534914" cy="1054358"/>
           </a:xfrm>
           <a:prstGeom prst="rect">
@@ -6427,25 +6427,7 @@
                 </a:solidFill>
                 <a:latin typeface="Titillium Web" panose="00000500000000000000" pitchFamily="2" charset="0"/>
               </a:rPr>
-              <a:t>OpenNeuroPET is developing infrastructure and tooling that </a:t>
-            </a:r>
-            <a:r>
-              <a:rPr lang="en-US" sz="10295">
-                <a:solidFill>
-                  <a:schemeClr val="bg1"/>
-                </a:solidFill>
-                <a:latin typeface="Titillium Web" panose="00000500000000000000" pitchFamily="2" charset="0"/>
-              </a:rPr>
-              <a:t>increases accessibility and reproducibility of </a:t>
-            </a:r>
-            <a:r>
-              <a:rPr lang="en-US" sz="10295" dirty="0">
-                <a:solidFill>
-                  <a:schemeClr val="bg1"/>
-                </a:solidFill>
-                <a:latin typeface="Titillium Web" panose="00000500000000000000" pitchFamily="2" charset="0"/>
-              </a:rPr>
-              <a:t>PET data.</a:t>
+              <a:t>OpenNeuroPET is developing infrastructure and tooling that increases accessibility and reproducibility of PET data.</a:t>
             </a:r>
           </a:p>
         </p:txBody>
@@ -6481,7 +6463,7 @@
         </p:blipFill>
         <p:spPr>
           <a:xfrm>
-            <a:off x="35040705" y="17280223"/>
+            <a:off x="35040705" y="12087843"/>
             <a:ext cx="4635587" cy="4635587"/>
           </a:xfrm>
           <a:prstGeom prst="rect">
@@ -6679,7 +6661,7 @@
           <a:p>
             <a:r>
               <a:rPr lang="en-US" sz="2246" dirty="0"/>
-              <a:t>One of the first steps to increasing the shareability of PET data was the inclusion of PET into the popular brain imaging data structure BIDS [1]  with the BIDS extension proposal 009 (BEP009 [2]). A standardized data format makes sharing different datasets simpler as part of the data dictionary is included in the file structure itself. Modalities follow a standard scheme and additional metadata is included in json or tab separated text files.  </a:t>
+              <a:t>One of the first steps to increasing the shareability of PET data was the inclusion of PET into the popular brain imaging data structure BIDS [2]  with the BIDS extension proposal 009 (BEP009 [3]). A standardized data format makes sharing different datasets simpler as part of the data dictionary is included in the file structure itself. Modalities follow a standard scheme and additional metadata is included in json or tab separated text files.  </a:t>
             </a:r>
           </a:p>
         </p:txBody>
@@ -6881,7 +6863,7 @@
             </a:r>
             <a:r>
               <a:rPr lang="en-US" sz="2246" dirty="0"/>
-              <a:t>. The BIDS Validator will tell you if the dataset is valid and you can collect, view, or run analysis on this standardized structure.</a:t>
+              <a:t> [4]. The BIDS Validator [8] will tell you if the dataset is valid and you can collect, view, or run analysis on this standardized structure.</a:t>
             </a:r>
           </a:p>
         </p:txBody>
@@ -7438,7 +7420,7 @@
         </p:nvSpPr>
         <p:spPr bwMode="auto">
           <a:xfrm>
-            <a:off x="22044365" y="15265020"/>
+            <a:off x="22044365" y="10072640"/>
             <a:ext cx="18970246" cy="2767690"/>
           </a:xfrm>
           <a:prstGeom prst="rect">
@@ -7625,7 +7607,7 @@
         </p:nvSpPr>
         <p:spPr>
           <a:xfrm>
-            <a:off x="22346211" y="18171850"/>
+            <a:off x="22346211" y="12979470"/>
             <a:ext cx="11071540" cy="3317831"/>
           </a:xfrm>
           <a:prstGeom prst="rect">
@@ -7687,7 +7669,7 @@
             </a:r>
             <a:r>
               <a:rPr lang="en-US" sz="2620" dirty="0" err="1"/>
-              <a:t>NIbabel</a:t>
+              <a:t>NiBabel</a:t>
             </a:r>
             <a:r>
               <a:rPr lang="en-US" sz="2620" dirty="0"/>
@@ -7712,7 +7694,7 @@
         </p:nvSpPr>
         <p:spPr bwMode="auto">
           <a:xfrm>
-            <a:off x="35349396" y="21440524"/>
+            <a:off x="35418185" y="16194554"/>
             <a:ext cx="4018204" cy="475231"/>
           </a:xfrm>
           <a:prstGeom prst="rect">
@@ -8314,7 +8296,7 @@
         </p:nvSpPr>
         <p:spPr bwMode="auto">
           <a:xfrm>
-            <a:off x="22046421" y="23329681"/>
+            <a:off x="22046421" y="18137301"/>
             <a:ext cx="10345766" cy="2767690"/>
           </a:xfrm>
           <a:prstGeom prst="rect">
@@ -8498,7 +8480,7 @@
         </p:blipFill>
         <p:spPr>
           <a:xfrm>
-            <a:off x="37944969" y="23695856"/>
+            <a:off x="37944969" y="18503476"/>
             <a:ext cx="2572186" cy="1853748"/>
           </a:xfrm>
           <a:prstGeom prst="rect">
@@ -8534,7 +8516,7 @@
         </p:blipFill>
         <p:spPr>
           <a:xfrm>
-            <a:off x="33992152" y="23738865"/>
+            <a:off x="33992152" y="18546485"/>
             <a:ext cx="2222704" cy="1949323"/>
           </a:xfrm>
           <a:prstGeom prst="rect">
@@ -8558,7 +8540,7 @@
         </p:nvSpPr>
         <p:spPr bwMode="auto">
           <a:xfrm>
-            <a:off x="22040142" y="21862165"/>
+            <a:off x="22040142" y="16669785"/>
             <a:ext cx="11000129" cy="1184850"/>
           </a:xfrm>
           <a:prstGeom prst="rect">
@@ -8711,6 +8693,878 @@
               </a:rPr>
               <a:t>We at OpenNeuroPET encourage you to reach out to us via the link to the right with questions or comments.</a:t>
             </a:r>
+          </a:p>
+        </p:txBody>
+      </p:sp>
+      <p:sp>
+        <p:nvSpPr>
+          <p:cNvPr id="45" name="Rectangle 44">
+            <a:extLst>
+              <a:ext uri="{FF2B5EF4-FFF2-40B4-BE49-F238E27FC236}">
+                <a16:creationId xmlns:a16="http://schemas.microsoft.com/office/drawing/2014/main" id="{522B6572-D51E-9D4E-A8FE-08F8DDB98585}"/>
+              </a:ext>
+            </a:extLst>
+          </p:cNvPr>
+          <p:cNvSpPr>
+            <a:spLocks noChangeArrowheads="1"/>
+          </p:cNvSpPr>
+          <p:nvPr/>
+        </p:nvSpPr>
+        <p:spPr bwMode="auto">
+          <a:xfrm>
+            <a:off x="21764331" y="21157406"/>
+            <a:ext cx="19534914" cy="1054358"/>
+          </a:xfrm>
+          <a:prstGeom prst="rect">
+            <a:avLst/>
+          </a:prstGeom>
+          <a:solidFill>
+            <a:schemeClr val="accent5"/>
+          </a:solidFill>
+          <a:ln w="12700">
+            <a:noFill/>
+            <a:miter lim="800000"/>
+          </a:ln>
+        </p:spPr>
+        <p:txBody>
+          <a:bodyPr wrap="none" lIns="256740" tIns="68464" rIns="256740" bIns="64169" anchor="ctr" anchorCtr="0"/>
+          <a:lstStyle>
+            <a:defPPr>
+              <a:defRPr lang="en-US"/>
+            </a:defPPr>
+            <a:lvl1pPr algn="l" rtl="0" eaLnBrk="0" fontAlgn="base" hangingPunct="0">
+              <a:spcBef>
+                <a:spcPct val="0"/>
+              </a:spcBef>
+              <a:spcAft>
+                <a:spcPct val="0"/>
+              </a:spcAft>
+              <a:defRPr sz="2400" kern="1200">
+                <a:solidFill>
+                  <a:schemeClr val="tx1"/>
+                </a:solidFill>
+                <a:effectLst>
+                  <a:outerShdw blurRad="38100" dist="38100" dir="2700000" algn="tl">
+                    <a:srgbClr val="000000">
+                      <a:alpha val="43137"/>
+                    </a:srgbClr>
+                  </a:outerShdw>
+                </a:effectLst>
+                <a:latin typeface="Times New Roman" pitchFamily="18" charset="0"/>
+                <a:ea typeface="+mn-ea"/>
+                <a:cs typeface="+mn-cs"/>
+              </a:defRPr>
+            </a:lvl1pPr>
+            <a:lvl2pPr marL="457200" algn="l" rtl="0" eaLnBrk="0" fontAlgn="base" hangingPunct="0">
+              <a:spcBef>
+                <a:spcPct val="0"/>
+              </a:spcBef>
+              <a:spcAft>
+                <a:spcPct val="0"/>
+              </a:spcAft>
+              <a:defRPr sz="2400" kern="1200">
+                <a:solidFill>
+                  <a:schemeClr val="tx1"/>
+                </a:solidFill>
+                <a:effectLst>
+                  <a:outerShdw blurRad="38100" dist="38100" dir="2700000" algn="tl">
+                    <a:srgbClr val="000000">
+                      <a:alpha val="43137"/>
+                    </a:srgbClr>
+                  </a:outerShdw>
+                </a:effectLst>
+                <a:latin typeface="Times New Roman" pitchFamily="18" charset="0"/>
+                <a:ea typeface="+mn-ea"/>
+                <a:cs typeface="+mn-cs"/>
+              </a:defRPr>
+            </a:lvl2pPr>
+            <a:lvl3pPr marL="914400" algn="l" rtl="0" eaLnBrk="0" fontAlgn="base" hangingPunct="0">
+              <a:spcBef>
+                <a:spcPct val="0"/>
+              </a:spcBef>
+              <a:spcAft>
+                <a:spcPct val="0"/>
+              </a:spcAft>
+              <a:defRPr sz="2400" kern="1200">
+                <a:solidFill>
+                  <a:schemeClr val="tx1"/>
+                </a:solidFill>
+                <a:effectLst>
+                  <a:outerShdw blurRad="38100" dist="38100" dir="2700000" algn="tl">
+                    <a:srgbClr val="000000">
+                      <a:alpha val="43137"/>
+                    </a:srgbClr>
+                  </a:outerShdw>
+                </a:effectLst>
+                <a:latin typeface="Times New Roman" pitchFamily="18" charset="0"/>
+                <a:ea typeface="+mn-ea"/>
+                <a:cs typeface="+mn-cs"/>
+              </a:defRPr>
+            </a:lvl3pPr>
+            <a:lvl4pPr marL="1371600" algn="l" rtl="0" eaLnBrk="0" fontAlgn="base" hangingPunct="0">
+              <a:spcBef>
+                <a:spcPct val="0"/>
+              </a:spcBef>
+              <a:spcAft>
+                <a:spcPct val="0"/>
+              </a:spcAft>
+              <a:defRPr sz="2400" kern="1200">
+                <a:solidFill>
+                  <a:schemeClr val="tx1"/>
+                </a:solidFill>
+                <a:effectLst>
+                  <a:outerShdw blurRad="38100" dist="38100" dir="2700000" algn="tl">
+                    <a:srgbClr val="000000">
+                      <a:alpha val="43137"/>
+                    </a:srgbClr>
+                  </a:outerShdw>
+                </a:effectLst>
+                <a:latin typeface="Times New Roman" pitchFamily="18" charset="0"/>
+                <a:ea typeface="+mn-ea"/>
+                <a:cs typeface="+mn-cs"/>
+              </a:defRPr>
+            </a:lvl4pPr>
+            <a:lvl5pPr marL="1828800" algn="l" rtl="0" eaLnBrk="0" fontAlgn="base" hangingPunct="0">
+              <a:spcBef>
+                <a:spcPct val="0"/>
+              </a:spcBef>
+              <a:spcAft>
+                <a:spcPct val="0"/>
+              </a:spcAft>
+              <a:defRPr sz="2400" kern="1200">
+                <a:solidFill>
+                  <a:schemeClr val="tx1"/>
+                </a:solidFill>
+                <a:effectLst>
+                  <a:outerShdw blurRad="38100" dist="38100" dir="2700000" algn="tl">
+                    <a:srgbClr val="000000">
+                      <a:alpha val="43137"/>
+                    </a:srgbClr>
+                  </a:outerShdw>
+                </a:effectLst>
+                <a:latin typeface="Times New Roman" pitchFamily="18" charset="0"/>
+                <a:ea typeface="+mn-ea"/>
+                <a:cs typeface="+mn-cs"/>
+              </a:defRPr>
+            </a:lvl5pPr>
+            <a:lvl6pPr marL="2286000" algn="l" defTabSz="914400" rtl="0" eaLnBrk="1" latinLnBrk="0" hangingPunct="1">
+              <a:defRPr sz="2400" kern="1200">
+                <a:solidFill>
+                  <a:schemeClr val="tx1"/>
+                </a:solidFill>
+                <a:effectLst>
+                  <a:outerShdw blurRad="38100" dist="38100" dir="2700000" algn="tl">
+                    <a:srgbClr val="000000">
+                      <a:alpha val="43137"/>
+                    </a:srgbClr>
+                  </a:outerShdw>
+                </a:effectLst>
+                <a:latin typeface="Times New Roman" pitchFamily="18" charset="0"/>
+                <a:ea typeface="+mn-ea"/>
+                <a:cs typeface="+mn-cs"/>
+              </a:defRPr>
+            </a:lvl6pPr>
+            <a:lvl7pPr marL="2743200" algn="l" defTabSz="914400" rtl="0" eaLnBrk="1" latinLnBrk="0" hangingPunct="1">
+              <a:defRPr sz="2400" kern="1200">
+                <a:solidFill>
+                  <a:schemeClr val="tx1"/>
+                </a:solidFill>
+                <a:effectLst>
+                  <a:outerShdw blurRad="38100" dist="38100" dir="2700000" algn="tl">
+                    <a:srgbClr val="000000">
+                      <a:alpha val="43137"/>
+                    </a:srgbClr>
+                  </a:outerShdw>
+                </a:effectLst>
+                <a:latin typeface="Times New Roman" pitchFamily="18" charset="0"/>
+                <a:ea typeface="+mn-ea"/>
+                <a:cs typeface="+mn-cs"/>
+              </a:defRPr>
+            </a:lvl7pPr>
+            <a:lvl8pPr marL="3200400" algn="l" defTabSz="914400" rtl="0" eaLnBrk="1" latinLnBrk="0" hangingPunct="1">
+              <a:defRPr sz="2400" kern="1200">
+                <a:solidFill>
+                  <a:schemeClr val="tx1"/>
+                </a:solidFill>
+                <a:effectLst>
+                  <a:outerShdw blurRad="38100" dist="38100" dir="2700000" algn="tl">
+                    <a:srgbClr val="000000">
+                      <a:alpha val="43137"/>
+                    </a:srgbClr>
+                  </a:outerShdw>
+                </a:effectLst>
+                <a:latin typeface="Times New Roman" pitchFamily="18" charset="0"/>
+                <a:ea typeface="+mn-ea"/>
+                <a:cs typeface="+mn-cs"/>
+              </a:defRPr>
+            </a:lvl8pPr>
+            <a:lvl9pPr marL="3657600" algn="l" defTabSz="914400" rtl="0" eaLnBrk="1" latinLnBrk="0" hangingPunct="1">
+              <a:defRPr sz="2400" kern="1200">
+                <a:solidFill>
+                  <a:schemeClr val="tx1"/>
+                </a:solidFill>
+                <a:effectLst>
+                  <a:outerShdw blurRad="38100" dist="38100" dir="2700000" algn="tl">
+                    <a:srgbClr val="000000">
+                      <a:alpha val="43137"/>
+                    </a:srgbClr>
+                  </a:outerShdw>
+                </a:effectLst>
+                <a:latin typeface="Times New Roman" pitchFamily="18" charset="0"/>
+                <a:ea typeface="+mn-ea"/>
+                <a:cs typeface="+mn-cs"/>
+              </a:defRPr>
+            </a:lvl9pPr>
+          </a:lstStyle>
+          <a:p>
+            <a:pPr defTabSz="4401089">
+              <a:defRPr/>
+            </a:pPr>
+            <a:r>
+              <a:rPr lang="en-US" sz="3931" dirty="0">
+                <a:solidFill>
+                  <a:schemeClr val="bg1"/>
+                </a:solidFill>
+                <a:effectLst/>
+                <a:latin typeface="Amaranth" panose="02000503050000020004" pitchFamily="2" charset="0"/>
+              </a:rPr>
+              <a:t>References</a:t>
+            </a:r>
+          </a:p>
+        </p:txBody>
+      </p:sp>
+      <p:sp>
+        <p:nvSpPr>
+          <p:cNvPr id="47" name="Text Box 6">
+            <a:extLst>
+              <a:ext uri="{FF2B5EF4-FFF2-40B4-BE49-F238E27FC236}">
+                <a16:creationId xmlns:a16="http://schemas.microsoft.com/office/drawing/2014/main" id="{F340ACE5-3DD6-0348-800A-EE28E98DCFC2}"/>
+              </a:ext>
+            </a:extLst>
+          </p:cNvPr>
+          <p:cNvSpPr txBox="1">
+            <a:spLocks noChangeArrowheads="1"/>
+          </p:cNvSpPr>
+          <p:nvPr/>
+        </p:nvSpPr>
+        <p:spPr bwMode="auto">
+          <a:xfrm>
+            <a:off x="21849036" y="22365556"/>
+            <a:ext cx="19378894" cy="4592384"/>
+          </a:xfrm>
+          <a:prstGeom prst="rect">
+            <a:avLst/>
+          </a:prstGeom>
+          <a:noFill/>
+          <a:ln>
+            <a:noFill/>
+          </a:ln>
+          <a:extLst>
+            <a:ext uri="{909E8E84-426E-40DD-AFC4-6F175D3DCCD1}">
+              <a14:hiddenFill xmlns:a14="http://schemas.microsoft.com/office/drawing/2010/main">
+                <a:solidFill>
+                  <a:schemeClr val="accent1"/>
+                </a:solidFill>
+              </a14:hiddenFill>
+            </a:ext>
+            <a:ext uri="{91240B29-F687-4F45-9708-019B960494DF}">
+              <a14:hiddenLine xmlns:a14="http://schemas.microsoft.com/office/drawing/2010/main" w="9525">
+                <a:solidFill>
+                  <a:schemeClr val="tx1"/>
+                </a:solidFill>
+                <a:miter lim="800000"/>
+                <a:headEnd/>
+                <a:tailEnd/>
+              </a14:hiddenLine>
+            </a:ext>
+            <a:ext uri="{AF507438-7753-43E0-B8FC-AC1667EBCBE1}">
+              <a14:hiddenEffects xmlns:a14="http://schemas.microsoft.com/office/drawing/2010/main">
+                <a:effectLst>
+                  <a:outerShdw dist="35921" dir="2700000" algn="ctr" rotWithShape="0">
+                    <a:schemeClr val="bg2"/>
+                  </a:outerShdw>
+                </a:effectLst>
+              </a14:hiddenEffects>
+            </a:ext>
+          </a:extLst>
+        </p:spPr>
+        <p:txBody>
+          <a:bodyPr wrap="square" lIns="128370" tIns="64185" rIns="128370" bIns="64185">
+            <a:spAutoFit/>
+          </a:bodyPr>
+          <a:lstStyle>
+            <a:defPPr>
+              <a:defRPr kern="1200" smtId="4294967295"/>
+            </a:defPPr>
+            <a:lvl1pPr defTabSz="4703763" eaLnBrk="0" hangingPunct="0">
+              <a:defRPr sz="9300">
+                <a:solidFill>
+                  <a:schemeClr val="tx1"/>
+                </a:solidFill>
+                <a:latin typeface="Arial"/>
+              </a:defRPr>
+            </a:lvl1pPr>
+            <a:lvl2pPr marL="742950" indent="-285750" defTabSz="4703763" eaLnBrk="0" hangingPunct="0">
+              <a:defRPr sz="9300">
+                <a:solidFill>
+                  <a:schemeClr val="tx1"/>
+                </a:solidFill>
+                <a:latin typeface="Arial"/>
+              </a:defRPr>
+            </a:lvl2pPr>
+            <a:lvl3pPr marL="1143000" indent="-228600" defTabSz="4703763" eaLnBrk="0" hangingPunct="0">
+              <a:defRPr sz="9300">
+                <a:solidFill>
+                  <a:schemeClr val="tx1"/>
+                </a:solidFill>
+                <a:latin typeface="Arial"/>
+              </a:defRPr>
+            </a:lvl3pPr>
+            <a:lvl4pPr marL="1600200" indent="-228600" defTabSz="4703763" eaLnBrk="0" hangingPunct="0">
+              <a:defRPr sz="9300">
+                <a:solidFill>
+                  <a:schemeClr val="tx1"/>
+                </a:solidFill>
+                <a:latin typeface="Arial"/>
+              </a:defRPr>
+            </a:lvl4pPr>
+            <a:lvl5pPr marL="2057400" indent="-228600" defTabSz="4703763" eaLnBrk="0" hangingPunct="0">
+              <a:defRPr sz="9300">
+                <a:solidFill>
+                  <a:schemeClr val="tx1"/>
+                </a:solidFill>
+                <a:latin typeface="Arial"/>
+              </a:defRPr>
+            </a:lvl5pPr>
+            <a:lvl6pPr marL="2514600" indent="-228600" defTabSz="4703763" eaLnBrk="0" fontAlgn="base" hangingPunct="0">
+              <a:spcBef>
+                <a:spcPct val="0"/>
+              </a:spcBef>
+              <a:spcAft>
+                <a:spcPct val="0"/>
+              </a:spcAft>
+              <a:defRPr sz="9300">
+                <a:solidFill>
+                  <a:schemeClr val="tx1"/>
+                </a:solidFill>
+                <a:latin typeface="Arial"/>
+              </a:defRPr>
+            </a:lvl6pPr>
+            <a:lvl7pPr marL="2971800" indent="-228600" defTabSz="4703763" eaLnBrk="0" fontAlgn="base" hangingPunct="0">
+              <a:spcBef>
+                <a:spcPct val="0"/>
+              </a:spcBef>
+              <a:spcAft>
+                <a:spcPct val="0"/>
+              </a:spcAft>
+              <a:defRPr sz="9300">
+                <a:solidFill>
+                  <a:schemeClr val="tx1"/>
+                </a:solidFill>
+                <a:latin typeface="Arial"/>
+              </a:defRPr>
+            </a:lvl7pPr>
+            <a:lvl8pPr marL="3429000" indent="-228600" defTabSz="4703763" eaLnBrk="0" fontAlgn="base" hangingPunct="0">
+              <a:spcBef>
+                <a:spcPct val="0"/>
+              </a:spcBef>
+              <a:spcAft>
+                <a:spcPct val="0"/>
+              </a:spcAft>
+              <a:defRPr sz="9300">
+                <a:solidFill>
+                  <a:schemeClr val="tx1"/>
+                </a:solidFill>
+                <a:latin typeface="Arial"/>
+              </a:defRPr>
+            </a:lvl8pPr>
+            <a:lvl9pPr marL="3886200" indent="-228600" defTabSz="4703763" eaLnBrk="0" fontAlgn="base" hangingPunct="0">
+              <a:spcBef>
+                <a:spcPct val="0"/>
+              </a:spcBef>
+              <a:spcAft>
+                <a:spcPct val="0"/>
+              </a:spcAft>
+              <a:defRPr sz="9300">
+                <a:solidFill>
+                  <a:schemeClr val="tx1"/>
+                </a:solidFill>
+                <a:latin typeface="Arial"/>
+              </a:defRPr>
+            </a:lvl9pPr>
+          </a:lstStyle>
+          <a:p>
+            <a:r>
+              <a:rPr lang="en-US" sz="1800" dirty="0">
+                <a:latin typeface="Titillium Web" panose="00000500000000000000" pitchFamily="2" charset="0"/>
+                <a:ea typeface="Open Sans" panose="020B0606030504020204" pitchFamily="34" charset="0"/>
+                <a:cs typeface="Open Sans" panose="020B0606030504020204" pitchFamily="34" charset="0"/>
+              </a:rPr>
+              <a:t>1. Innis RB, Cunningham VJ, </a:t>
+            </a:r>
+            <a:r>
+              <a:rPr lang="en-US" sz="1800" dirty="0" err="1">
+                <a:latin typeface="Titillium Web" panose="00000500000000000000" pitchFamily="2" charset="0"/>
+                <a:ea typeface="Open Sans" panose="020B0606030504020204" pitchFamily="34" charset="0"/>
+                <a:cs typeface="Open Sans" panose="020B0606030504020204" pitchFamily="34" charset="0"/>
+              </a:rPr>
+              <a:t>Delforge</a:t>
+            </a:r>
+            <a:r>
+              <a:rPr lang="en-US" sz="1800" dirty="0">
+                <a:latin typeface="Titillium Web" panose="00000500000000000000" pitchFamily="2" charset="0"/>
+                <a:ea typeface="Open Sans" panose="020B0606030504020204" pitchFamily="34" charset="0"/>
+                <a:cs typeface="Open Sans" panose="020B0606030504020204" pitchFamily="34" charset="0"/>
+              </a:rPr>
+              <a:t> J, Fujita M, </a:t>
+            </a:r>
+            <a:r>
+              <a:rPr lang="en-US" sz="1800" dirty="0" err="1">
+                <a:latin typeface="Titillium Web" panose="00000500000000000000" pitchFamily="2" charset="0"/>
+                <a:ea typeface="Open Sans" panose="020B0606030504020204" pitchFamily="34" charset="0"/>
+                <a:cs typeface="Open Sans" panose="020B0606030504020204" pitchFamily="34" charset="0"/>
+              </a:rPr>
+              <a:t>Gjedde</a:t>
+            </a:r>
+            <a:r>
+              <a:rPr lang="en-US" sz="1800" dirty="0">
+                <a:latin typeface="Titillium Web" panose="00000500000000000000" pitchFamily="2" charset="0"/>
+                <a:ea typeface="Open Sans" panose="020B0606030504020204" pitchFamily="34" charset="0"/>
+                <a:cs typeface="Open Sans" panose="020B0606030504020204" pitchFamily="34" charset="0"/>
+              </a:rPr>
+              <a:t> A, Gunn RN, Holden J, Houle S, Huang SC, </a:t>
+            </a:r>
+            <a:r>
+              <a:rPr lang="en-US" sz="1800" dirty="0" err="1">
+                <a:latin typeface="Titillium Web" panose="00000500000000000000" pitchFamily="2" charset="0"/>
+                <a:ea typeface="Open Sans" panose="020B0606030504020204" pitchFamily="34" charset="0"/>
+                <a:cs typeface="Open Sans" panose="020B0606030504020204" pitchFamily="34" charset="0"/>
+              </a:rPr>
+              <a:t>Ichise</a:t>
+            </a:r>
+            <a:r>
+              <a:rPr lang="en-US" sz="1800" dirty="0">
+                <a:latin typeface="Titillium Web" panose="00000500000000000000" pitchFamily="2" charset="0"/>
+                <a:ea typeface="Open Sans" panose="020B0606030504020204" pitchFamily="34" charset="0"/>
+                <a:cs typeface="Open Sans" panose="020B0606030504020204" pitchFamily="34" charset="0"/>
+              </a:rPr>
+              <a:t> M, Iida H. Consensus nomenclature for in vivo imaging of reversibly binding radioligands. Journal of Cerebral Blood Flow &amp; Metabolism. 2007 Sep;27(9):1533-9.</a:t>
+            </a:r>
+            <a:br>
+              <a:rPr lang="en-US" sz="1800" dirty="0">
+                <a:latin typeface="Titillium Web" panose="00000500000000000000" pitchFamily="2" charset="0"/>
+                <a:ea typeface="Open Sans" panose="020B0606030504020204" pitchFamily="34" charset="0"/>
+                <a:cs typeface="Open Sans" panose="020B0606030504020204" pitchFamily="34" charset="0"/>
+              </a:rPr>
+            </a:br>
+            <a:r>
+              <a:rPr lang="en-US" sz="1800" dirty="0">
+                <a:latin typeface="Titillium Web" panose="00000500000000000000" pitchFamily="2" charset="0"/>
+                <a:ea typeface="Open Sans" panose="020B0606030504020204" pitchFamily="34" charset="0"/>
+                <a:cs typeface="Open Sans" panose="020B0606030504020204" pitchFamily="34" charset="0"/>
+              </a:rPr>
+              <a:t>2. </a:t>
+            </a:r>
+            <a:r>
+              <a:rPr lang="en-US" sz="1800" dirty="0" err="1">
+                <a:latin typeface="Titillium Web" panose="00000500000000000000" pitchFamily="2" charset="0"/>
+                <a:ea typeface="Open Sans" panose="020B0606030504020204" pitchFamily="34" charset="0"/>
+                <a:cs typeface="Open Sans" panose="020B0606030504020204" pitchFamily="34" charset="0"/>
+              </a:rPr>
+              <a:t>Gorgolewski</a:t>
+            </a:r>
+            <a:r>
+              <a:rPr lang="en-US" sz="1800" dirty="0">
+                <a:latin typeface="Titillium Web" panose="00000500000000000000" pitchFamily="2" charset="0"/>
+                <a:ea typeface="Open Sans" panose="020B0606030504020204" pitchFamily="34" charset="0"/>
+                <a:cs typeface="Open Sans" panose="020B0606030504020204" pitchFamily="34" charset="0"/>
+              </a:rPr>
+              <a:t> KJ, Auer T, Calhoun VD, Craddock RC, Das S, Duff EP, </a:t>
+            </a:r>
+            <a:r>
+              <a:rPr lang="en-US" sz="1800" dirty="0" err="1">
+                <a:latin typeface="Titillium Web" panose="00000500000000000000" pitchFamily="2" charset="0"/>
+                <a:ea typeface="Open Sans" panose="020B0606030504020204" pitchFamily="34" charset="0"/>
+                <a:cs typeface="Open Sans" panose="020B0606030504020204" pitchFamily="34" charset="0"/>
+              </a:rPr>
+              <a:t>Flandin</a:t>
+            </a:r>
+            <a:r>
+              <a:rPr lang="en-US" sz="1800" dirty="0">
+                <a:latin typeface="Titillium Web" panose="00000500000000000000" pitchFamily="2" charset="0"/>
+                <a:ea typeface="Open Sans" panose="020B0606030504020204" pitchFamily="34" charset="0"/>
+                <a:cs typeface="Open Sans" panose="020B0606030504020204" pitchFamily="34" charset="0"/>
+              </a:rPr>
+              <a:t> G, Ghosh SS, </a:t>
+            </a:r>
+            <a:r>
+              <a:rPr lang="en-US" sz="1800" dirty="0" err="1">
+                <a:latin typeface="Titillium Web" panose="00000500000000000000" pitchFamily="2" charset="0"/>
+                <a:ea typeface="Open Sans" panose="020B0606030504020204" pitchFamily="34" charset="0"/>
+                <a:cs typeface="Open Sans" panose="020B0606030504020204" pitchFamily="34" charset="0"/>
+              </a:rPr>
+              <a:t>Glatard</a:t>
+            </a:r>
+            <a:r>
+              <a:rPr lang="en-US" sz="1800" dirty="0">
+                <a:latin typeface="Titillium Web" panose="00000500000000000000" pitchFamily="2" charset="0"/>
+                <a:ea typeface="Open Sans" panose="020B0606030504020204" pitchFamily="34" charset="0"/>
+                <a:cs typeface="Open Sans" panose="020B0606030504020204" pitchFamily="34" charset="0"/>
+              </a:rPr>
+              <a:t> T, </a:t>
+            </a:r>
+            <a:r>
+              <a:rPr lang="en-US" sz="1800" dirty="0" err="1">
+                <a:latin typeface="Titillium Web" panose="00000500000000000000" pitchFamily="2" charset="0"/>
+                <a:ea typeface="Open Sans" panose="020B0606030504020204" pitchFamily="34" charset="0"/>
+                <a:cs typeface="Open Sans" panose="020B0606030504020204" pitchFamily="34" charset="0"/>
+              </a:rPr>
+              <a:t>Halchenko</a:t>
+            </a:r>
+            <a:r>
+              <a:rPr lang="en-US" sz="1800" dirty="0">
+                <a:latin typeface="Titillium Web" panose="00000500000000000000" pitchFamily="2" charset="0"/>
+                <a:ea typeface="Open Sans" panose="020B0606030504020204" pitchFamily="34" charset="0"/>
+                <a:cs typeface="Open Sans" panose="020B0606030504020204" pitchFamily="34" charset="0"/>
+              </a:rPr>
+              <a:t> YO, </a:t>
+            </a:r>
+            <a:r>
+              <a:rPr lang="en-US" sz="1800" dirty="0" err="1">
+                <a:latin typeface="Titillium Web" panose="00000500000000000000" pitchFamily="2" charset="0"/>
+                <a:ea typeface="Open Sans" panose="020B0606030504020204" pitchFamily="34" charset="0"/>
+                <a:cs typeface="Open Sans" panose="020B0606030504020204" pitchFamily="34" charset="0"/>
+              </a:rPr>
+              <a:t>Handwerker</a:t>
+            </a:r>
+            <a:r>
+              <a:rPr lang="en-US" sz="1800" dirty="0">
+                <a:latin typeface="Titillium Web" panose="00000500000000000000" pitchFamily="2" charset="0"/>
+                <a:ea typeface="Open Sans" panose="020B0606030504020204" pitchFamily="34" charset="0"/>
+                <a:cs typeface="Open Sans" panose="020B0606030504020204" pitchFamily="34" charset="0"/>
+              </a:rPr>
+              <a:t> DA. The brain imaging data structure, a format for organizing and describing outputs of neuroimaging experiments. Scientific data. 2016 Jun 21;3(1):1-9.</a:t>
+            </a:r>
+            <a:br>
+              <a:rPr lang="en-US" sz="1800" dirty="0">
+                <a:latin typeface="Titillium Web" panose="00000500000000000000" pitchFamily="2" charset="0"/>
+                <a:ea typeface="Open Sans" panose="020B0606030504020204" pitchFamily="34" charset="0"/>
+                <a:cs typeface="Open Sans" panose="020B0606030504020204" pitchFamily="34" charset="0"/>
+              </a:rPr>
+            </a:br>
+            <a:r>
+              <a:rPr lang="en-US" sz="1800" dirty="0">
+                <a:latin typeface="Titillium Web" panose="00000500000000000000" pitchFamily="2" charset="0"/>
+                <a:ea typeface="Open Sans" panose="020B0606030504020204" pitchFamily="34" charset="0"/>
+                <a:cs typeface="Open Sans" panose="020B0606030504020204" pitchFamily="34" charset="0"/>
+              </a:rPr>
+              <a:t>3. Norgaard M, Matheson GJ, Hansen HD, Thomas AG, Searle G, Rizzo G, Veronese M, </a:t>
+            </a:r>
+            <a:r>
+              <a:rPr lang="en-US" sz="1800" dirty="0" err="1">
+                <a:latin typeface="Titillium Web" panose="00000500000000000000" pitchFamily="2" charset="0"/>
+                <a:ea typeface="Open Sans" panose="020B0606030504020204" pitchFamily="34" charset="0"/>
+                <a:cs typeface="Open Sans" panose="020B0606030504020204" pitchFamily="34" charset="0"/>
+              </a:rPr>
+              <a:t>Giacomel</a:t>
+            </a:r>
+            <a:r>
+              <a:rPr lang="en-US" sz="1800" dirty="0">
+                <a:latin typeface="Titillium Web" panose="00000500000000000000" pitchFamily="2" charset="0"/>
+                <a:ea typeface="Open Sans" panose="020B0606030504020204" pitchFamily="34" charset="0"/>
+                <a:cs typeface="Open Sans" panose="020B0606030504020204" pitchFamily="34" charset="0"/>
+              </a:rPr>
+              <a:t> A, </a:t>
+            </a:r>
+            <a:r>
+              <a:rPr lang="en-US" sz="1800" dirty="0" err="1">
+                <a:latin typeface="Titillium Web" panose="00000500000000000000" pitchFamily="2" charset="0"/>
+                <a:ea typeface="Open Sans" panose="020B0606030504020204" pitchFamily="34" charset="0"/>
+                <a:cs typeface="Open Sans" panose="020B0606030504020204" pitchFamily="34" charset="0"/>
+              </a:rPr>
+              <a:t>Yaqub</a:t>
+            </a:r>
+            <a:r>
+              <a:rPr lang="en-US" sz="1800" dirty="0">
+                <a:latin typeface="Titillium Web" panose="00000500000000000000" pitchFamily="2" charset="0"/>
+                <a:ea typeface="Open Sans" panose="020B0606030504020204" pitchFamily="34" charset="0"/>
+                <a:cs typeface="Open Sans" panose="020B0606030504020204" pitchFamily="34" charset="0"/>
+              </a:rPr>
+              <a:t> M, </a:t>
+            </a:r>
+            <a:r>
+              <a:rPr lang="en-US" sz="1800" dirty="0" err="1">
+                <a:latin typeface="Titillium Web" panose="00000500000000000000" pitchFamily="2" charset="0"/>
+                <a:ea typeface="Open Sans" panose="020B0606030504020204" pitchFamily="34" charset="0"/>
+                <a:cs typeface="Open Sans" panose="020B0606030504020204" pitchFamily="34" charset="0"/>
+              </a:rPr>
+              <a:t>Tonietto</a:t>
+            </a:r>
+            <a:r>
+              <a:rPr lang="en-US" sz="1800" dirty="0">
+                <a:latin typeface="Titillium Web" panose="00000500000000000000" pitchFamily="2" charset="0"/>
+                <a:ea typeface="Open Sans" panose="020B0606030504020204" pitchFamily="34" charset="0"/>
+                <a:cs typeface="Open Sans" panose="020B0606030504020204" pitchFamily="34" charset="0"/>
+              </a:rPr>
+              <a:t> M, </a:t>
+            </a:r>
+            <a:r>
+              <a:rPr lang="en-US" sz="1800" dirty="0" err="1">
+                <a:latin typeface="Titillium Web" panose="00000500000000000000" pitchFamily="2" charset="0"/>
+                <a:ea typeface="Open Sans" panose="020B0606030504020204" pitchFamily="34" charset="0"/>
+                <a:cs typeface="Open Sans" panose="020B0606030504020204" pitchFamily="34" charset="0"/>
+              </a:rPr>
+              <a:t>Funck</a:t>
+            </a:r>
+            <a:r>
+              <a:rPr lang="en-US" sz="1800" dirty="0">
+                <a:latin typeface="Titillium Web" panose="00000500000000000000" pitchFamily="2" charset="0"/>
+                <a:ea typeface="Open Sans" panose="020B0606030504020204" pitchFamily="34" charset="0"/>
+                <a:cs typeface="Open Sans" panose="020B0606030504020204" pitchFamily="34" charset="0"/>
+              </a:rPr>
+              <a:t> T. PET-BIDS, an extension to the brain imaging data structure for positron emission tomography. </a:t>
+            </a:r>
+            <a:r>
+              <a:rPr lang="en-US" sz="1800" dirty="0" err="1">
+                <a:latin typeface="Titillium Web" panose="00000500000000000000" pitchFamily="2" charset="0"/>
+                <a:ea typeface="Open Sans" panose="020B0606030504020204" pitchFamily="34" charset="0"/>
+                <a:cs typeface="Open Sans" panose="020B0606030504020204" pitchFamily="34" charset="0"/>
+              </a:rPr>
+              <a:t>bioRxiv</a:t>
+            </a:r>
+            <a:r>
+              <a:rPr lang="en-US" sz="1800" dirty="0">
+                <a:latin typeface="Titillium Web" panose="00000500000000000000" pitchFamily="2" charset="0"/>
+                <a:ea typeface="Open Sans" panose="020B0606030504020204" pitchFamily="34" charset="0"/>
+                <a:cs typeface="Open Sans" panose="020B0606030504020204" pitchFamily="34" charset="0"/>
+              </a:rPr>
+              <a:t>. 2021 Jan 1.</a:t>
+            </a:r>
+            <a:br>
+              <a:rPr lang="en-US" sz="1800" dirty="0">
+                <a:latin typeface="Titillium Web" panose="00000500000000000000" pitchFamily="2" charset="0"/>
+                <a:ea typeface="Open Sans" panose="020B0606030504020204" pitchFamily="34" charset="0"/>
+                <a:cs typeface="Open Sans" panose="020B0606030504020204" pitchFamily="34" charset="0"/>
+              </a:rPr>
+            </a:br>
+            <a:r>
+              <a:rPr lang="en-US" sz="1800" dirty="0">
+                <a:latin typeface="Titillium Web" panose="00000500000000000000" pitchFamily="2" charset="0"/>
+                <a:ea typeface="Open Sans" panose="020B0606030504020204" pitchFamily="34" charset="0"/>
+                <a:cs typeface="Open Sans" panose="020B0606030504020204" pitchFamily="34" charset="0"/>
+              </a:rPr>
+              <a:t>4. </a:t>
+            </a:r>
+            <a:r>
+              <a:rPr lang="en-US" sz="1800" dirty="0" err="1">
+                <a:latin typeface="Titillium Web" panose="00000500000000000000" pitchFamily="2" charset="0"/>
+                <a:ea typeface="Open Sans" panose="020B0606030504020204" pitchFamily="34" charset="0"/>
+                <a:cs typeface="Open Sans" panose="020B0606030504020204" pitchFamily="34" charset="0"/>
+              </a:rPr>
+              <a:t>Gorgolewski</a:t>
+            </a:r>
+            <a:r>
+              <a:rPr lang="en-US" sz="1800" dirty="0">
+                <a:latin typeface="Titillium Web" panose="00000500000000000000" pitchFamily="2" charset="0"/>
+                <a:ea typeface="Open Sans" panose="020B0606030504020204" pitchFamily="34" charset="0"/>
+                <a:cs typeface="Open Sans" panose="020B0606030504020204" pitchFamily="34" charset="0"/>
+              </a:rPr>
+              <a:t> K, Esteban O, Schaefer G, </a:t>
+            </a:r>
+            <a:r>
+              <a:rPr lang="en-US" sz="1800" dirty="0" err="1">
+                <a:latin typeface="Titillium Web" panose="00000500000000000000" pitchFamily="2" charset="0"/>
+                <a:ea typeface="Open Sans" panose="020B0606030504020204" pitchFamily="34" charset="0"/>
+                <a:cs typeface="Open Sans" panose="020B0606030504020204" pitchFamily="34" charset="0"/>
+              </a:rPr>
+              <a:t>Wandell</a:t>
+            </a:r>
+            <a:r>
+              <a:rPr lang="en-US" sz="1800" dirty="0">
+                <a:latin typeface="Titillium Web" panose="00000500000000000000" pitchFamily="2" charset="0"/>
+                <a:ea typeface="Open Sans" panose="020B0606030504020204" pitchFamily="34" charset="0"/>
+                <a:cs typeface="Open Sans" panose="020B0606030504020204" pitchFamily="34" charset="0"/>
+              </a:rPr>
+              <a:t> B, </a:t>
+            </a:r>
+            <a:r>
+              <a:rPr lang="en-US" sz="1800" dirty="0" err="1">
+                <a:latin typeface="Titillium Web" panose="00000500000000000000" pitchFamily="2" charset="0"/>
+                <a:ea typeface="Open Sans" panose="020B0606030504020204" pitchFamily="34" charset="0"/>
+                <a:cs typeface="Open Sans" panose="020B0606030504020204" pitchFamily="34" charset="0"/>
+              </a:rPr>
+              <a:t>Poldrack</a:t>
+            </a:r>
+            <a:r>
+              <a:rPr lang="en-US" sz="1800" dirty="0">
+                <a:latin typeface="Titillium Web" panose="00000500000000000000" pitchFamily="2" charset="0"/>
+                <a:ea typeface="Open Sans" panose="020B0606030504020204" pitchFamily="34" charset="0"/>
+                <a:cs typeface="Open Sans" panose="020B0606030504020204" pitchFamily="34" charset="0"/>
+              </a:rPr>
+              <a:t> R. OpenNeuro—a free online platform for sharing and analysis of neuroimaging data. Organization for human brain mapping. Vancouver, Canada. 2017 Jun;1677(2).</a:t>
+            </a:r>
+          </a:p>
+          <a:p>
+            <a:r>
+              <a:rPr lang="en-US" sz="1800" dirty="0">
+                <a:latin typeface="Titillium Web" panose="00000500000000000000" pitchFamily="2" charset="0"/>
+                <a:ea typeface="Open Sans" panose="020B0606030504020204" pitchFamily="34" charset="0"/>
+                <a:cs typeface="Open Sans" panose="020B0606030504020204" pitchFamily="34" charset="0"/>
+              </a:rPr>
+              <a:t>5. </a:t>
+            </a:r>
+            <a:r>
+              <a:rPr lang="en-US" sz="1800" dirty="0" err="1"/>
+              <a:t>Greve</a:t>
+            </a:r>
+            <a:r>
+              <a:rPr lang="en-US" sz="1800" dirty="0"/>
+              <a:t>, D. N., Salat, D. H., Bowen, S. L., </a:t>
+            </a:r>
+            <a:r>
+              <a:rPr lang="en-US" sz="1800" dirty="0" err="1"/>
+              <a:t>Izquierdo</a:t>
+            </a:r>
+            <a:r>
+              <a:rPr lang="en-US" sz="1800" dirty="0"/>
+              <a:t>-Garcia, D., Schultz, A. P., </a:t>
+            </a:r>
+            <a:r>
+              <a:rPr lang="en-US" sz="1800" dirty="0" err="1"/>
+              <a:t>Catana</a:t>
+            </a:r>
+            <a:r>
+              <a:rPr lang="en-US" sz="1800" dirty="0"/>
+              <a:t>, C., ... &amp; Johnson, K. A. (2016). Different partial volume correction methods lead to different conclusions: An 18 F-FDG-PET study of aging. </a:t>
+            </a:r>
+            <a:r>
+              <a:rPr lang="en-US" sz="1800" dirty="0">
+                <a:hlinkClick r:id="rId25"/>
+              </a:rPr>
+              <a:t>NeuroImage</a:t>
+            </a:r>
+            <a:r>
+              <a:rPr lang="en-US" sz="1800" dirty="0"/>
+              <a:t>, 132, 334-343. </a:t>
+            </a:r>
+          </a:p>
+          <a:p>
+            <a:r>
+              <a:rPr lang="en-US" sz="1800" dirty="0"/>
+              <a:t>6. </a:t>
+            </a:r>
+            <a:r>
+              <a:rPr lang="en-US" sz="1800" dirty="0" err="1"/>
+              <a:t>Greve</a:t>
+            </a:r>
+            <a:r>
+              <a:rPr lang="en-US" sz="1800" dirty="0"/>
+              <a:t>, D. N., </a:t>
+            </a:r>
+            <a:r>
+              <a:rPr lang="en-US" sz="1800" dirty="0" err="1"/>
+              <a:t>Svarer</a:t>
+            </a:r>
+            <a:r>
+              <a:rPr lang="en-US" sz="1800" dirty="0"/>
+              <a:t>, C., Fisher, P. M., Feng, L., Hansen, A. E., </a:t>
+            </a:r>
+            <a:r>
+              <a:rPr lang="en-US" sz="1800" dirty="0" err="1"/>
+              <a:t>Baare</a:t>
+            </a:r>
+            <a:r>
+              <a:rPr lang="en-US" sz="1800" dirty="0"/>
+              <a:t>, W., ... &amp; Knudsen, G. M. (2014). Cortical surface-based analysis reduces bias and variance in kinetic modeling of brain PET data. Neuroimage, 92, 225-236. </a:t>
+            </a:r>
+          </a:p>
+          <a:p>
+            <a:r>
+              <a:rPr lang="en-US" sz="1800" dirty="0"/>
+              <a:t>7. Most work on </a:t>
+            </a:r>
+            <a:r>
+              <a:rPr lang="en-US" sz="1800" dirty="0" err="1"/>
+              <a:t>NiBabel</a:t>
+            </a:r>
+            <a:r>
+              <a:rPr lang="en-US" sz="1800" dirty="0"/>
+              <a:t> so far has been by Matthew Brett (MB), Chris Markiewicz (CM), Michael Hanke (MH), Marc-Alexandre </a:t>
+            </a:r>
+            <a:r>
+              <a:rPr lang="en-US" sz="1800" dirty="0" err="1"/>
+              <a:t>Côté</a:t>
+            </a:r>
+            <a:r>
+              <a:rPr lang="en-US" sz="1800" dirty="0"/>
+              <a:t> (MC), Ben Cipollini (BC), Paul McCarthy (PM), Chris Cheng (CC), </a:t>
+            </a:r>
+            <a:r>
+              <a:rPr lang="en-US" sz="1800" dirty="0" err="1"/>
+              <a:t>Yaroslav</a:t>
+            </a:r>
+            <a:r>
+              <a:rPr lang="en-US" sz="1800" dirty="0"/>
+              <a:t> </a:t>
+            </a:r>
+            <a:r>
+              <a:rPr lang="en-US" sz="1800" dirty="0" err="1"/>
+              <a:t>Halchenko</a:t>
+            </a:r>
+            <a:r>
+              <a:rPr lang="en-US" sz="1800" dirty="0"/>
+              <a:t> (YOH), </a:t>
+            </a:r>
+            <a:r>
+              <a:rPr lang="en-US" sz="1800" dirty="0" err="1"/>
+              <a:t>Satra</a:t>
+            </a:r>
+            <a:r>
+              <a:rPr lang="en-US" sz="1800" dirty="0"/>
+              <a:t> Ghosh (SG), Eric Larson (EL), </a:t>
+            </a:r>
+            <a:r>
+              <a:rPr lang="en-US" sz="1800" dirty="0" err="1"/>
+              <a:t>Demian</a:t>
+            </a:r>
+            <a:r>
+              <a:rPr lang="en-US" sz="1800" dirty="0"/>
+              <a:t> Wassermann, Stephan Gerhard and Ross </a:t>
+            </a:r>
+            <a:r>
+              <a:rPr lang="en-US" sz="1800" dirty="0" err="1"/>
+              <a:t>Markello</a:t>
+            </a:r>
+            <a:r>
+              <a:rPr lang="en-US" sz="1800" dirty="0"/>
+              <a:t> (RM).</a:t>
+            </a:r>
+          </a:p>
+          <a:p>
+            <a:r>
+              <a:rPr lang="en-US" sz="1800" dirty="0"/>
+              <a:t>8. https://</a:t>
+            </a:r>
+            <a:r>
+              <a:rPr lang="en-US" sz="1800" dirty="0" err="1"/>
+              <a:t>github.com</a:t>
+            </a:r>
+            <a:r>
+              <a:rPr lang="en-US" sz="1800" dirty="0"/>
+              <a:t>/bids-standard/</a:t>
+            </a:r>
+            <a:r>
+              <a:rPr lang="en-US" sz="1800" dirty="0" err="1"/>
+              <a:t>bids-validator#acknowledgments</a:t>
+            </a:r>
+            <a:endParaRPr lang="en-US" sz="1800" dirty="0"/>
+          </a:p>
+          <a:p>
+            <a:endParaRPr lang="en-US" sz="2000" dirty="0">
+              <a:latin typeface="Titillium Web" panose="00000500000000000000" pitchFamily="2" charset="0"/>
+              <a:ea typeface="Open Sans" panose="020B0606030504020204" pitchFamily="34" charset="0"/>
+              <a:cs typeface="Open Sans" panose="020B0606030504020204" pitchFamily="34" charset="0"/>
+            </a:endParaRPr>
           </a:p>
         </p:txBody>
       </p:sp>

</xml_diff>